<commit_message>
documentation, and xlsx file browse
</commit_message>
<xml_diff>
--- a/Excel-Format-Guide.pptx
+++ b/Excel-Format-Guide.pptx
@@ -6,12 +6,13 @@
   </p:sldMasterIdLst>
   <p:sldIdLst>
     <p:sldId id="256" r:id="rId2"/>
-    <p:sldId id="257" r:id="rId3"/>
-    <p:sldId id="258" r:id="rId4"/>
-    <p:sldId id="259" r:id="rId5"/>
-    <p:sldId id="261" r:id="rId6"/>
-    <p:sldId id="262" r:id="rId7"/>
-    <p:sldId id="263" r:id="rId8"/>
+    <p:sldId id="264" r:id="rId3"/>
+    <p:sldId id="257" r:id="rId4"/>
+    <p:sldId id="258" r:id="rId5"/>
+    <p:sldId id="259" r:id="rId6"/>
+    <p:sldId id="261" r:id="rId7"/>
+    <p:sldId id="262" r:id="rId8"/>
+    <p:sldId id="263" r:id="rId9"/>
   </p:sldIdLst>
   <p:sldSz cx="12192000" cy="6858000"/>
   <p:notesSz cx="6858000" cy="9144000"/>
@@ -110,6 +111,11 @@
       </a:defRPr>
     </a:lvl9pPr>
   </p:defaultTextStyle>
+  <p:extLst>
+    <p:ext uri="{EFAFB233-063F-42B5-8137-9DF3F51BA10A}">
+      <p15:sldGuideLst xmlns:p15="http://schemas.microsoft.com/office/powerpoint/2012/main"/>
+    </p:ext>
+  </p:extLst>
 </p:presentation>
 </file>
 
@@ -260,7 +266,7 @@
           <a:p>
             <a:fld id="{038640BD-4995-4CC7-A328-138DEE6A7104}" type="datetimeFigureOut">
               <a:rPr lang="en-US" smtClean="0"/>
-              <a:t>9/26/2025</a:t>
+              <a:t>12/5/2025</a:t>
             </a:fld>
             <a:endParaRPr lang="en-US"/>
           </a:p>
@@ -458,7 +464,7 @@
           <a:p>
             <a:fld id="{038640BD-4995-4CC7-A328-138DEE6A7104}" type="datetimeFigureOut">
               <a:rPr lang="en-US" smtClean="0"/>
-              <a:t>9/26/2025</a:t>
+              <a:t>12/5/2025</a:t>
             </a:fld>
             <a:endParaRPr lang="en-US"/>
           </a:p>
@@ -666,7 +672,7 @@
           <a:p>
             <a:fld id="{038640BD-4995-4CC7-A328-138DEE6A7104}" type="datetimeFigureOut">
               <a:rPr lang="en-US" smtClean="0"/>
-              <a:t>9/26/2025</a:t>
+              <a:t>12/5/2025</a:t>
             </a:fld>
             <a:endParaRPr lang="en-US"/>
           </a:p>
@@ -864,7 +870,7 @@
           <a:p>
             <a:fld id="{038640BD-4995-4CC7-A328-138DEE6A7104}" type="datetimeFigureOut">
               <a:rPr lang="en-US" smtClean="0"/>
-              <a:t>9/26/2025</a:t>
+              <a:t>12/5/2025</a:t>
             </a:fld>
             <a:endParaRPr lang="en-US"/>
           </a:p>
@@ -1139,7 +1145,7 @@
           <a:p>
             <a:fld id="{038640BD-4995-4CC7-A328-138DEE6A7104}" type="datetimeFigureOut">
               <a:rPr lang="en-US" smtClean="0"/>
-              <a:t>9/26/2025</a:t>
+              <a:t>12/5/2025</a:t>
             </a:fld>
             <a:endParaRPr lang="en-US"/>
           </a:p>
@@ -1404,7 +1410,7 @@
           <a:p>
             <a:fld id="{038640BD-4995-4CC7-A328-138DEE6A7104}" type="datetimeFigureOut">
               <a:rPr lang="en-US" smtClean="0"/>
-              <a:t>9/26/2025</a:t>
+              <a:t>12/5/2025</a:t>
             </a:fld>
             <a:endParaRPr lang="en-US"/>
           </a:p>
@@ -1816,7 +1822,7 @@
           <a:p>
             <a:fld id="{038640BD-4995-4CC7-A328-138DEE6A7104}" type="datetimeFigureOut">
               <a:rPr lang="en-US" smtClean="0"/>
-              <a:t>9/26/2025</a:t>
+              <a:t>12/5/2025</a:t>
             </a:fld>
             <a:endParaRPr lang="en-US"/>
           </a:p>
@@ -1957,7 +1963,7 @@
           <a:p>
             <a:fld id="{038640BD-4995-4CC7-A328-138DEE6A7104}" type="datetimeFigureOut">
               <a:rPr lang="en-US" smtClean="0"/>
-              <a:t>9/26/2025</a:t>
+              <a:t>12/5/2025</a:t>
             </a:fld>
             <a:endParaRPr lang="en-US"/>
           </a:p>
@@ -2070,7 +2076,7 @@
           <a:p>
             <a:fld id="{038640BD-4995-4CC7-A328-138DEE6A7104}" type="datetimeFigureOut">
               <a:rPr lang="en-US" smtClean="0"/>
-              <a:t>9/26/2025</a:t>
+              <a:t>12/5/2025</a:t>
             </a:fld>
             <a:endParaRPr lang="en-US"/>
           </a:p>
@@ -2381,7 +2387,7 @@
           <a:p>
             <a:fld id="{038640BD-4995-4CC7-A328-138DEE6A7104}" type="datetimeFigureOut">
               <a:rPr lang="en-US" smtClean="0"/>
-              <a:t>9/26/2025</a:t>
+              <a:t>12/5/2025</a:t>
             </a:fld>
             <a:endParaRPr lang="en-US"/>
           </a:p>
@@ -2669,7 +2675,7 @@
           <a:p>
             <a:fld id="{038640BD-4995-4CC7-A328-138DEE6A7104}" type="datetimeFigureOut">
               <a:rPr lang="en-US" smtClean="0"/>
-              <a:t>9/26/2025</a:t>
+              <a:t>12/5/2025</a:t>
             </a:fld>
             <a:endParaRPr lang="en-US"/>
           </a:p>
@@ -2910,7 +2916,7 @@
           <a:p>
             <a:fld id="{038640BD-4995-4CC7-A328-138DEE6A7104}" type="datetimeFigureOut">
               <a:rPr lang="en-US" smtClean="0"/>
-              <a:t>9/26/2025</a:t>
+              <a:t>12/5/2025</a:t>
             </a:fld>
             <a:endParaRPr lang="en-US"/>
           </a:p>
@@ -3448,7 +3454,13 @@
   <p:cSld>
     <p:spTree>
       <p:nvGrpSpPr>
-        <p:cNvPr id="1" name=""/>
+        <p:cNvPr id="1" name="">
+          <a:extLst>
+            <a:ext uri="{FF2B5EF4-FFF2-40B4-BE49-F238E27FC236}">
+              <a16:creationId xmlns:a16="http://schemas.microsoft.com/office/drawing/2014/main" id="{B2512F62-DDF0-2493-335A-33E7D6BF5D05}"/>
+            </a:ext>
+          </a:extLst>
+        </p:cNvPr>
         <p:cNvGrpSpPr/>
         <p:nvPr/>
       </p:nvGrpSpPr>
@@ -3460,12 +3472,79 @@
           <a:chExt cx="0" cy="0"/>
         </a:xfrm>
       </p:grpSpPr>
+      <p:sp>
+        <p:nvSpPr>
+          <p:cNvPr id="7" name="TextBox 6">
+            <a:extLst>
+              <a:ext uri="{FF2B5EF4-FFF2-40B4-BE49-F238E27FC236}">
+                <a16:creationId xmlns:a16="http://schemas.microsoft.com/office/drawing/2014/main" id="{F837F3A8-54B7-0184-1B9E-64A6B23E5626}"/>
+              </a:ext>
+            </a:extLst>
+          </p:cNvPr>
+          <p:cNvSpPr txBox="1"/>
+          <p:nvPr/>
+        </p:nvSpPr>
+        <p:spPr>
+          <a:xfrm>
+            <a:off x="397933" y="330239"/>
+            <a:ext cx="10363199" cy="2123658"/>
+          </a:xfrm>
+          <a:prstGeom prst="rect">
+            <a:avLst/>
+          </a:prstGeom>
+          <a:noFill/>
+        </p:spPr>
+        <p:txBody>
+          <a:bodyPr wrap="square" rtlCol="0">
+            <a:spAutoFit/>
+          </a:bodyPr>
+          <a:lstStyle/>
+          <a:p>
+            <a:r>
+              <a:rPr lang="en-US" sz="2400" b="1" u="sng" dirty="0"/>
+              <a:t>Goal of this tool:</a:t>
+            </a:r>
+          </a:p>
+          <a:p>
+            <a:endParaRPr lang="en-US" b="1" u="sng" dirty="0"/>
+          </a:p>
+          <a:p>
+            <a:r>
+              <a:rPr lang="en-US" dirty="0"/>
+              <a:t>Automation of lens data import to Zemax, from generalized excel-based format</a:t>
+            </a:r>
+          </a:p>
+          <a:p>
+            <a:endParaRPr lang="en-US" dirty="0"/>
+          </a:p>
+          <a:p>
+            <a:r>
+              <a:rPr lang="en-US" dirty="0"/>
+              <a:t>As an example of specific use case, lens data found in a patent PDF can be reformatted by i.e. AI into this excel format, and then read into Zemax.</a:t>
+            </a:r>
+          </a:p>
+          <a:p>
+            <a:r>
+              <a:rPr lang="en-US" dirty="0"/>
+              <a:t>(ideally the AI could directly create the .</a:t>
+            </a:r>
+            <a:r>
+              <a:rPr lang="en-US" dirty="0" err="1"/>
+              <a:t>zmx</a:t>
+            </a:r>
+            <a:r>
+              <a:rPr lang="en-US" dirty="0"/>
+              <a:t> file, but I’ve found this approach problematic)</a:t>
+            </a:r>
+          </a:p>
+        </p:txBody>
+      </p:sp>
       <p:pic>
         <p:nvPicPr>
-          <p:cNvPr id="10" name="Picture 9">
-            <a:extLst>
-              <a:ext uri="{FF2B5EF4-FFF2-40B4-BE49-F238E27FC236}">
-                <a16:creationId xmlns:a16="http://schemas.microsoft.com/office/drawing/2014/main" id="{8E5347B3-2772-3BB9-6437-F548F3E4FB7A}"/>
+          <p:cNvPr id="2" name="Picture 1">
+            <a:extLst>
+              <a:ext uri="{FF2B5EF4-FFF2-40B4-BE49-F238E27FC236}">
+                <a16:creationId xmlns:a16="http://schemas.microsoft.com/office/drawing/2014/main" id="{E2714B31-225C-9714-C2A1-4A2F00A74C66}"/>
               </a:ext>
             </a:extLst>
           </p:cNvPr>
@@ -3476,14 +3555,15 @@
         </p:nvPicPr>
         <p:blipFill>
           <a:blip r:embed="rId2"/>
+          <a:srcRect b="6666"/>
           <a:stretch>
             <a:fillRect/>
           </a:stretch>
         </p:blipFill>
         <p:spPr>
           <a:xfrm>
-            <a:off x="2027786" y="3107438"/>
-            <a:ext cx="7116214" cy="3317935"/>
+            <a:off x="764890" y="3183429"/>
+            <a:ext cx="1981137" cy="3344332"/>
           </a:xfrm>
           <a:prstGeom prst="rect">
             <a:avLst/>
@@ -3492,10 +3572,10 @@
       </p:pic>
       <p:sp>
         <p:nvSpPr>
-          <p:cNvPr id="7" name="TextBox 6">
-            <a:extLst>
-              <a:ext uri="{FF2B5EF4-FFF2-40B4-BE49-F238E27FC236}">
-                <a16:creationId xmlns:a16="http://schemas.microsoft.com/office/drawing/2014/main" id="{966CC397-0CA1-6CCF-3D05-1D9748A89D6E}"/>
+          <p:cNvPr id="3" name="TextBox 2">
+            <a:extLst>
+              <a:ext uri="{FF2B5EF4-FFF2-40B4-BE49-F238E27FC236}">
+                <a16:creationId xmlns:a16="http://schemas.microsoft.com/office/drawing/2014/main" id="{B5EE47AA-D574-A1F7-BD4A-468E5D2D4F17}"/>
               </a:ext>
             </a:extLst>
           </p:cNvPr>
@@ -3504,8 +3584,8 @@
         </p:nvSpPr>
         <p:spPr>
           <a:xfrm>
-            <a:off x="406400" y="499534"/>
-            <a:ext cx="8458200" cy="1477328"/>
+            <a:off x="420289" y="6441466"/>
+            <a:ext cx="6096000" cy="369332"/>
           </a:xfrm>
           <a:prstGeom prst="rect">
             <a:avLst/>
@@ -3513,50 +3593,27 @@
           <a:noFill/>
         </p:spPr>
         <p:txBody>
-          <a:bodyPr wrap="square" rtlCol="0">
+          <a:bodyPr wrap="square">
             <a:spAutoFit/>
           </a:bodyPr>
           <a:lstStyle/>
           <a:p>
             <a:r>
-              <a:rPr lang="en-US" b="1" u="sng" dirty="0"/>
-              <a:t>Column A contains meta-data used for the data import</a:t>
-            </a:r>
-          </a:p>
-          <a:p>
-            <a:r>
-              <a:rPr lang="en-US" dirty="0"/>
-              <a:t>There are 5 keys (META, SURF, ASPH, CONF, WAVE), corresponding to 5 blocks of data; each data block (table) has its own size and headers. </a:t>
-            </a:r>
-          </a:p>
-          <a:p>
-            <a:r>
-              <a:rPr lang="en-US" dirty="0"/>
-              <a:t>Each key is used to create a pandas </a:t>
-            </a:r>
-            <a:r>
-              <a:rPr lang="en-US" dirty="0" err="1"/>
-              <a:t>dataframe</a:t>
-            </a:r>
-            <a:r>
-              <a:rPr lang="en-US" dirty="0"/>
-              <a:t> for the data block.</a:t>
-            </a:r>
-          </a:p>
-          <a:p>
-            <a:r>
-              <a:rPr lang="en-US" dirty="0"/>
-              <a:t>The formatting for each of these 5 data blocks is explained in the following pages.</a:t>
-            </a:r>
-          </a:p>
-        </p:txBody>
-      </p:sp>
-      <p:sp>
-        <p:nvSpPr>
-          <p:cNvPr id="9" name="Rectangle 8">
-            <a:extLst>
-              <a:ext uri="{FF2B5EF4-FFF2-40B4-BE49-F238E27FC236}">
-                <a16:creationId xmlns:a16="http://schemas.microsoft.com/office/drawing/2014/main" id="{24CC5CEC-E718-5248-7726-449897CE2594}"/>
+              <a:rPr lang="en-US">
+                <a:hlinkClick r:id="rId3"/>
+              </a:rPr>
+              <a:t>US8054560B2 - Zoom lens - Google Patents</a:t>
+            </a:r>
+            <a:endParaRPr lang="en-US"/>
+          </a:p>
+        </p:txBody>
+      </p:sp>
+      <p:sp>
+        <p:nvSpPr>
+          <p:cNvPr id="4" name="Rectangle 3">
+            <a:extLst>
+              <a:ext uri="{FF2B5EF4-FFF2-40B4-BE49-F238E27FC236}">
+                <a16:creationId xmlns:a16="http://schemas.microsoft.com/office/drawing/2014/main" id="{6835C773-C7A5-5E34-1237-7FE77385BB1A}"/>
               </a:ext>
             </a:extLst>
           </p:cNvPr>
@@ -3565,22 +3622,17 @@
         </p:nvSpPr>
         <p:spPr>
           <a:xfrm>
-            <a:off x="2235201" y="3107439"/>
-            <a:ext cx="575732" cy="3214114"/>
+            <a:off x="206028" y="2870162"/>
+            <a:ext cx="2539999" cy="626533"/>
           </a:xfrm>
           <a:prstGeom prst="rect">
             <a:avLst/>
           </a:prstGeom>
           <a:solidFill>
-            <a:srgbClr val="FFC000">
-              <a:alpha val="20000"/>
-            </a:srgbClr>
+            <a:schemeClr val="bg2">
+              <a:lumMod val="75000"/>
+            </a:schemeClr>
           </a:solidFill>
-          <a:ln>
-            <a:solidFill>
-              <a:srgbClr val="FFC000"/>
-            </a:solidFill>
-          </a:ln>
         </p:spPr>
         <p:style>
           <a:lnRef idx="2">
@@ -3603,38 +3655,64 @@
           <a:lstStyle/>
           <a:p>
             <a:pPr algn="ctr"/>
-            <a:endParaRPr lang="en-US"/>
-          </a:p>
-        </p:txBody>
-      </p:sp>
-      <p:sp>
-        <p:nvSpPr>
-          <p:cNvPr id="11" name="Rectangle 10">
-            <a:extLst>
-              <a:ext uri="{FF2B5EF4-FFF2-40B4-BE49-F238E27FC236}">
-                <a16:creationId xmlns:a16="http://schemas.microsoft.com/office/drawing/2014/main" id="{53B78B6E-9704-C549-4385-706E517B91DB}"/>
-              </a:ext>
-            </a:extLst>
-          </p:cNvPr>
-          <p:cNvSpPr/>
+            <a:r>
+              <a:rPr lang="en-US" sz="1600"/>
+              <a:t>Lens Patent</a:t>
+            </a:r>
+          </a:p>
+        </p:txBody>
+      </p:sp>
+      <p:pic>
+        <p:nvPicPr>
+          <p:cNvPr id="5" name="Picture 4">
+            <a:extLst>
+              <a:ext uri="{FF2B5EF4-FFF2-40B4-BE49-F238E27FC236}">
+                <a16:creationId xmlns:a16="http://schemas.microsoft.com/office/drawing/2014/main" id="{2D8F941A-CB8A-A0C7-95AB-625E0E344824}"/>
+              </a:ext>
+            </a:extLst>
+          </p:cNvPr>
+          <p:cNvPicPr>
+            <a:picLocks noChangeAspect="1"/>
+          </p:cNvPicPr>
           <p:nvPr/>
-        </p:nvSpPr>
-        <p:spPr>
-          <a:xfrm>
-            <a:off x="2819401" y="3276600"/>
-            <a:ext cx="795866" cy="338668"/>
+        </p:nvPicPr>
+        <p:blipFill>
+          <a:blip r:embed="rId4"/>
+          <a:srcRect l="-1" r="43213"/>
+          <a:stretch>
+            <a:fillRect/>
+          </a:stretch>
+        </p:blipFill>
+        <p:spPr>
+          <a:xfrm>
+            <a:off x="3906275" y="2900392"/>
+            <a:ext cx="3408925" cy="3221616"/>
           </a:xfrm>
           <a:prstGeom prst="rect">
             <a:avLst/>
           </a:prstGeom>
-          <a:solidFill>
-            <a:schemeClr val="accent2">
-              <a:alpha val="20000"/>
-            </a:schemeClr>
-          </a:solidFill>
-          <a:ln>
-            <a:noFill/>
-          </a:ln>
+        </p:spPr>
+      </p:pic>
+      <p:sp>
+        <p:nvSpPr>
+          <p:cNvPr id="6" name="Arrow: Right 5">
+            <a:extLst>
+              <a:ext uri="{FF2B5EF4-FFF2-40B4-BE49-F238E27FC236}">
+                <a16:creationId xmlns:a16="http://schemas.microsoft.com/office/drawing/2014/main" id="{6FBFBE31-6AAF-7A3C-0F25-A5F68AD00480}"/>
+              </a:ext>
+            </a:extLst>
+          </p:cNvPr>
+          <p:cNvSpPr/>
+          <p:nvPr/>
+        </p:nvSpPr>
+        <p:spPr>
+          <a:xfrm>
+            <a:off x="2625524" y="2813016"/>
+            <a:ext cx="1685529" cy="740823"/>
+          </a:xfrm>
+          <a:prstGeom prst="rightArrow">
+            <a:avLst/>
+          </a:prstGeom>
         </p:spPr>
         <p:style>
           <a:lnRef idx="2">
@@ -3657,16 +3735,19 @@
           <a:lstStyle/>
           <a:p>
             <a:pPr algn="ctr"/>
-            <a:endParaRPr lang="en-US"/>
-          </a:p>
-        </p:txBody>
-      </p:sp>
-      <p:sp>
-        <p:nvSpPr>
-          <p:cNvPr id="12" name="Rectangle 11">
-            <a:extLst>
-              <a:ext uri="{FF2B5EF4-FFF2-40B4-BE49-F238E27FC236}">
-                <a16:creationId xmlns:a16="http://schemas.microsoft.com/office/drawing/2014/main" id="{D2C57569-31F2-5B85-97FA-F439A42456EB}"/>
+            <a:r>
+              <a:rPr lang="en-US"/>
+              <a:t>ChatGPT</a:t>
+            </a:r>
+          </a:p>
+        </p:txBody>
+      </p:sp>
+      <p:sp>
+        <p:nvSpPr>
+          <p:cNvPr id="8" name="Rectangle 7">
+            <a:extLst>
+              <a:ext uri="{FF2B5EF4-FFF2-40B4-BE49-F238E27FC236}">
+                <a16:creationId xmlns:a16="http://schemas.microsoft.com/office/drawing/2014/main" id="{7F4FE6CD-F723-60C1-5D48-E651C06B1AAF}"/>
               </a:ext>
             </a:extLst>
           </p:cNvPr>
@@ -3675,22 +3756,17 @@
         </p:nvSpPr>
         <p:spPr>
           <a:xfrm>
-            <a:off x="2827867" y="3632199"/>
-            <a:ext cx="6146799" cy="821267"/>
+            <a:off x="4400764" y="2861695"/>
+            <a:ext cx="2539999" cy="626533"/>
           </a:xfrm>
           <a:prstGeom prst="rect">
             <a:avLst/>
           </a:prstGeom>
           <a:solidFill>
-            <a:schemeClr val="accent5">
-              <a:lumMod val="20000"/>
-              <a:lumOff val="80000"/>
-              <a:alpha val="20000"/>
+            <a:schemeClr val="bg2">
+              <a:lumMod val="75000"/>
             </a:schemeClr>
           </a:solidFill>
-          <a:ln>
-            <a:noFill/>
-          </a:ln>
         </p:spPr>
         <p:style>
           <a:lnRef idx="2">
@@ -3713,40 +3789,63 @@
           <a:lstStyle/>
           <a:p>
             <a:pPr algn="ctr"/>
-            <a:endParaRPr lang="en-US"/>
-          </a:p>
-        </p:txBody>
-      </p:sp>
-      <p:sp>
-        <p:nvSpPr>
-          <p:cNvPr id="13" name="Rectangle 12">
-            <a:extLst>
-              <a:ext uri="{FF2B5EF4-FFF2-40B4-BE49-F238E27FC236}">
-                <a16:creationId xmlns:a16="http://schemas.microsoft.com/office/drawing/2014/main" id="{5B1372B4-B39D-60C6-3D20-07AB265975DF}"/>
-              </a:ext>
-            </a:extLst>
-          </p:cNvPr>
-          <p:cNvSpPr/>
+            <a:r>
+              <a:rPr lang="en-US" sz="1600"/>
+              <a:t>Standardized Excel format</a:t>
+            </a:r>
+          </a:p>
+        </p:txBody>
+      </p:sp>
+      <p:pic>
+        <p:nvPicPr>
+          <p:cNvPr id="21" name="Picture 20">
+            <a:extLst>
+              <a:ext uri="{FF2B5EF4-FFF2-40B4-BE49-F238E27FC236}">
+                <a16:creationId xmlns:a16="http://schemas.microsoft.com/office/drawing/2014/main" id="{61BAB2C1-953E-CF04-C84D-0F95B587D0D7}"/>
+              </a:ext>
+            </a:extLst>
+          </p:cNvPr>
+          <p:cNvPicPr>
+            <a:picLocks noChangeAspect="1"/>
+          </p:cNvPicPr>
           <p:nvPr/>
-        </p:nvSpPr>
-        <p:spPr>
-          <a:xfrm>
-            <a:off x="2810933" y="4445000"/>
-            <a:ext cx="2929467" cy="541868"/>
+        </p:nvPicPr>
+        <p:blipFill>
+          <a:blip r:embed="rId5"/>
+          <a:stretch>
+            <a:fillRect/>
+          </a:stretch>
+        </p:blipFill>
+        <p:spPr>
+          <a:xfrm>
+            <a:off x="8107180" y="2900392"/>
+            <a:ext cx="3878792" cy="1985312"/>
           </a:xfrm>
           <a:prstGeom prst="rect">
             <a:avLst/>
           </a:prstGeom>
-          <a:solidFill>
-            <a:schemeClr val="tx2">
-              <a:lumMod val="50000"/>
-              <a:lumOff val="50000"/>
-              <a:alpha val="20000"/>
-            </a:schemeClr>
-          </a:solidFill>
-          <a:ln>
-            <a:noFill/>
-          </a:ln>
+        </p:spPr>
+      </p:pic>
+      <p:sp>
+        <p:nvSpPr>
+          <p:cNvPr id="22" name="Arrow: Right 21">
+            <a:extLst>
+              <a:ext uri="{FF2B5EF4-FFF2-40B4-BE49-F238E27FC236}">
+                <a16:creationId xmlns:a16="http://schemas.microsoft.com/office/drawing/2014/main" id="{A3800DE9-0548-72E1-E1D6-230EEFA2B29F}"/>
+              </a:ext>
+            </a:extLst>
+          </p:cNvPr>
+          <p:cNvSpPr/>
+          <p:nvPr/>
+        </p:nvSpPr>
+        <p:spPr>
+          <a:xfrm>
+            <a:off x="7163798" y="2664429"/>
+            <a:ext cx="1434301" cy="1094643"/>
+          </a:xfrm>
+          <a:prstGeom prst="rightArrow">
+            <a:avLst/>
+          </a:prstGeom>
         </p:spPr>
         <p:style>
           <a:lnRef idx="2">
@@ -3769,16 +3868,19 @@
           <a:lstStyle/>
           <a:p>
             <a:pPr algn="ctr"/>
-            <a:endParaRPr lang="en-US"/>
-          </a:p>
-        </p:txBody>
-      </p:sp>
-      <p:sp>
-        <p:nvSpPr>
-          <p:cNvPr id="14" name="Rectangle 13">
-            <a:extLst>
-              <a:ext uri="{FF2B5EF4-FFF2-40B4-BE49-F238E27FC236}">
-                <a16:creationId xmlns:a16="http://schemas.microsoft.com/office/drawing/2014/main" id="{F157C920-1E0B-0939-E07B-3E3851DDE2EF}"/>
+            <a:r>
+              <a:rPr lang="en-US"/>
+              <a:t>ZOSAPI Tool</a:t>
+            </a:r>
+          </a:p>
+        </p:txBody>
+      </p:sp>
+      <p:sp>
+        <p:nvSpPr>
+          <p:cNvPr id="23" name="Rectangle 22">
+            <a:extLst>
+              <a:ext uri="{FF2B5EF4-FFF2-40B4-BE49-F238E27FC236}">
+                <a16:creationId xmlns:a16="http://schemas.microsoft.com/office/drawing/2014/main" id="{93040C31-BD9B-403E-3889-E1D0B0024090}"/>
               </a:ext>
             </a:extLst>
           </p:cNvPr>
@@ -3787,20 +3889,17 @@
         </p:nvSpPr>
         <p:spPr>
           <a:xfrm>
-            <a:off x="2819401" y="4978400"/>
-            <a:ext cx="1854200" cy="660400"/>
+            <a:off x="8692253" y="2898483"/>
+            <a:ext cx="2539999" cy="626533"/>
           </a:xfrm>
           <a:prstGeom prst="rect">
             <a:avLst/>
           </a:prstGeom>
           <a:solidFill>
-            <a:srgbClr val="C00000">
-              <a:alpha val="20000"/>
-            </a:srgbClr>
+            <a:schemeClr val="bg2">
+              <a:lumMod val="75000"/>
+            </a:schemeClr>
           </a:solidFill>
-          <a:ln>
-            <a:noFill/>
-          </a:ln>
         </p:spPr>
         <p:style>
           <a:lnRef idx="2">
@@ -3823,16 +3922,165 @@
           <a:lstStyle/>
           <a:p>
             <a:pPr algn="ctr"/>
-            <a:endParaRPr lang="en-US"/>
-          </a:p>
-        </p:txBody>
-      </p:sp>
-      <p:sp>
-        <p:nvSpPr>
-          <p:cNvPr id="15" name="Rectangle 14">
-            <a:extLst>
-              <a:ext uri="{FF2B5EF4-FFF2-40B4-BE49-F238E27FC236}">
-                <a16:creationId xmlns:a16="http://schemas.microsoft.com/office/drawing/2014/main" id="{34EE00C8-D392-0B7A-5DCF-B89D983D1AFE}"/>
+            <a:r>
+              <a:rPr lang="en-US" sz="1600"/>
+              <a:t>Zemax model</a:t>
+            </a:r>
+          </a:p>
+        </p:txBody>
+      </p:sp>
+    </p:spTree>
+    <p:extLst>
+      <p:ext uri="{BB962C8B-B14F-4D97-AF65-F5344CB8AC3E}">
+        <p14:creationId xmlns:p14="http://schemas.microsoft.com/office/powerpoint/2010/main" val="1658017598"/>
+      </p:ext>
+    </p:extLst>
+  </p:cSld>
+  <p:clrMapOvr>
+    <a:masterClrMapping/>
+  </p:clrMapOvr>
+</p:sld>
+</file>
+
+<file path=ppt/slides/slide3.xml><?xml version="1.0" encoding="utf-8"?>
+<p:sld xmlns:a="http://schemas.openxmlformats.org/drawingml/2006/main" xmlns:r="http://schemas.openxmlformats.org/officeDocument/2006/relationships" xmlns:p="http://schemas.openxmlformats.org/presentationml/2006/main">
+  <p:cSld>
+    <p:spTree>
+      <p:nvGrpSpPr>
+        <p:cNvPr id="1" name=""/>
+        <p:cNvGrpSpPr/>
+        <p:nvPr/>
+      </p:nvGrpSpPr>
+      <p:grpSpPr>
+        <a:xfrm>
+          <a:off x="0" y="0"/>
+          <a:ext cx="0" cy="0"/>
+          <a:chOff x="0" y="0"/>
+          <a:chExt cx="0" cy="0"/>
+        </a:xfrm>
+      </p:grpSpPr>
+      <p:pic>
+        <p:nvPicPr>
+          <p:cNvPr id="10" name="Picture 9">
+            <a:extLst>
+              <a:ext uri="{FF2B5EF4-FFF2-40B4-BE49-F238E27FC236}">
+                <a16:creationId xmlns:a16="http://schemas.microsoft.com/office/drawing/2014/main" id="{8E5347B3-2772-3BB9-6437-F548F3E4FB7A}"/>
+              </a:ext>
+            </a:extLst>
+          </p:cNvPr>
+          <p:cNvPicPr>
+            <a:picLocks noChangeAspect="1"/>
+          </p:cNvPicPr>
+          <p:nvPr/>
+        </p:nvPicPr>
+        <p:blipFill>
+          <a:blip r:embed="rId2"/>
+          <a:stretch>
+            <a:fillRect/>
+          </a:stretch>
+        </p:blipFill>
+        <p:spPr>
+          <a:xfrm>
+            <a:off x="2027786" y="3107438"/>
+            <a:ext cx="7116214" cy="3317935"/>
+          </a:xfrm>
+          <a:prstGeom prst="rect">
+            <a:avLst/>
+          </a:prstGeom>
+        </p:spPr>
+      </p:pic>
+      <p:sp>
+        <p:nvSpPr>
+          <p:cNvPr id="7" name="TextBox 6">
+            <a:extLst>
+              <a:ext uri="{FF2B5EF4-FFF2-40B4-BE49-F238E27FC236}">
+                <a16:creationId xmlns:a16="http://schemas.microsoft.com/office/drawing/2014/main" id="{966CC397-0CA1-6CCF-3D05-1D9748A89D6E}"/>
+              </a:ext>
+            </a:extLst>
+          </p:cNvPr>
+          <p:cNvSpPr txBox="1"/>
+          <p:nvPr/>
+        </p:nvSpPr>
+        <p:spPr>
+          <a:xfrm>
+            <a:off x="406400" y="499534"/>
+            <a:ext cx="9067800" cy="1846659"/>
+          </a:xfrm>
+          <a:prstGeom prst="rect">
+            <a:avLst/>
+          </a:prstGeom>
+          <a:noFill/>
+        </p:spPr>
+        <p:txBody>
+          <a:bodyPr wrap="square" rtlCol="0">
+            <a:spAutoFit/>
+          </a:bodyPr>
+          <a:lstStyle/>
+          <a:p>
+            <a:r>
+              <a:rPr lang="en-US" sz="2400" b="1" u="sng" dirty="0"/>
+              <a:t>Column A contains meta-data used for the data import</a:t>
+            </a:r>
+          </a:p>
+          <a:p>
+            <a:endParaRPr lang="en-US" dirty="0"/>
+          </a:p>
+          <a:p>
+            <a:pPr marL="285750" indent="-285750">
+              <a:buFont typeface="Arial" panose="020B0604020202020204" pitchFamily="34" charset="0"/>
+              <a:buChar char="•"/>
+            </a:pPr>
+            <a:r>
+              <a:rPr lang="en-US" dirty="0"/>
+              <a:t>There are 5 keys (META, SURF, ASPH, CONF, WAVE), corresponding to 5 blocks of data</a:t>
+            </a:r>
+          </a:p>
+          <a:p>
+            <a:pPr marL="285750" indent="-285750">
+              <a:buFont typeface="Arial" panose="020B0604020202020204" pitchFamily="34" charset="0"/>
+              <a:buChar char="•"/>
+            </a:pPr>
+            <a:r>
+              <a:rPr lang="en-US" dirty="0"/>
+              <a:t>Each data block (sub-table) has its own size, and headers. </a:t>
+            </a:r>
+          </a:p>
+          <a:p>
+            <a:pPr marL="285750" indent="-285750">
+              <a:buFont typeface="Arial" panose="020B0604020202020204" pitchFamily="34" charset="0"/>
+              <a:buChar char="•"/>
+            </a:pPr>
+            <a:r>
+              <a:rPr lang="en-US" dirty="0"/>
+              <a:t>Each key is used to create a pandas </a:t>
+            </a:r>
+            <a:r>
+              <a:rPr lang="en-US" dirty="0" err="1"/>
+              <a:t>dataframe</a:t>
+            </a:r>
+            <a:r>
+              <a:rPr lang="en-US" dirty="0"/>
+              <a:t> for the data block.</a:t>
+            </a:r>
+          </a:p>
+          <a:p>
+            <a:pPr marL="285750" indent="-285750">
+              <a:buFont typeface="Arial" panose="020B0604020202020204" pitchFamily="34" charset="0"/>
+              <a:buChar char="•"/>
+            </a:pPr>
+            <a:r>
+              <a:rPr lang="en-US" dirty="0"/>
+              <a:t>The formatting for each of these 5 data blocks is explained in the following pages.</a:t>
+            </a:r>
+          </a:p>
+        </p:txBody>
+      </p:sp>
+      <p:sp>
+        <p:nvSpPr>
+          <p:cNvPr id="9" name="Rectangle 8">
+            <a:extLst>
+              <a:ext uri="{FF2B5EF4-FFF2-40B4-BE49-F238E27FC236}">
+                <a16:creationId xmlns:a16="http://schemas.microsoft.com/office/drawing/2014/main" id="{24CC5CEC-E718-5248-7726-449897CE2594}"/>
               </a:ext>
             </a:extLst>
           </p:cNvPr>
@@ -3841,19 +4089,21 @@
         </p:nvSpPr>
         <p:spPr>
           <a:xfrm>
-            <a:off x="2819401" y="5663184"/>
-            <a:ext cx="2937931" cy="678348"/>
+            <a:off x="2235201" y="3107439"/>
+            <a:ext cx="575732" cy="3214114"/>
           </a:xfrm>
           <a:prstGeom prst="rect">
             <a:avLst/>
           </a:prstGeom>
           <a:solidFill>
-            <a:srgbClr val="92D050">
+            <a:srgbClr val="FFC000">
               <a:alpha val="20000"/>
             </a:srgbClr>
           </a:solidFill>
           <a:ln>
-            <a:noFill/>
+            <a:solidFill>
+              <a:srgbClr val="FFC000"/>
+            </a:solidFill>
           </a:ln>
         </p:spPr>
         <p:style>
@@ -3883,10 +4133,10 @@
       </p:sp>
       <p:sp>
         <p:nvSpPr>
-          <p:cNvPr id="16" name="Rectangle 15">
-            <a:extLst>
-              <a:ext uri="{FF2B5EF4-FFF2-40B4-BE49-F238E27FC236}">
-                <a16:creationId xmlns:a16="http://schemas.microsoft.com/office/drawing/2014/main" id="{2589EA60-411F-2497-0990-135904A6C1A4}"/>
+          <p:cNvPr id="11" name="Rectangle 10">
+            <a:extLst>
+              <a:ext uri="{FF2B5EF4-FFF2-40B4-BE49-F238E27FC236}">
+                <a16:creationId xmlns:a16="http://schemas.microsoft.com/office/drawing/2014/main" id="{53B78B6E-9704-C549-4385-706E517B91DB}"/>
               </a:ext>
             </a:extLst>
           </p:cNvPr>
@@ -3895,17 +4145,19 @@
         </p:nvSpPr>
         <p:spPr>
           <a:xfrm>
-            <a:off x="2243667" y="3285068"/>
-            <a:ext cx="1371599" cy="313266"/>
+            <a:off x="2819401" y="3276600"/>
+            <a:ext cx="795866" cy="338668"/>
           </a:xfrm>
           <a:prstGeom prst="rect">
             <a:avLst/>
           </a:prstGeom>
-          <a:noFill/>
+          <a:solidFill>
+            <a:schemeClr val="accent2">
+              <a:alpha val="20000"/>
+            </a:schemeClr>
+          </a:solidFill>
           <a:ln>
-            <a:solidFill>
-              <a:srgbClr val="FFC000"/>
-            </a:solidFill>
+            <a:noFill/>
           </a:ln>
         </p:spPr>
         <p:style>
@@ -3935,10 +4187,10 @@
       </p:sp>
       <p:sp>
         <p:nvSpPr>
-          <p:cNvPr id="17" name="Rectangle 16">
-            <a:extLst>
-              <a:ext uri="{FF2B5EF4-FFF2-40B4-BE49-F238E27FC236}">
-                <a16:creationId xmlns:a16="http://schemas.microsoft.com/office/drawing/2014/main" id="{F3B55A15-4F46-FA8A-16B3-42FEC004A0C2}"/>
+          <p:cNvPr id="12" name="Rectangle 11">
+            <a:extLst>
+              <a:ext uri="{FF2B5EF4-FFF2-40B4-BE49-F238E27FC236}">
+                <a16:creationId xmlns:a16="http://schemas.microsoft.com/office/drawing/2014/main" id="{D2C57569-31F2-5B85-97FA-F439A42456EB}"/>
               </a:ext>
             </a:extLst>
           </p:cNvPr>
@@ -3947,17 +4199,21 @@
         </p:nvSpPr>
         <p:spPr>
           <a:xfrm>
-            <a:off x="2243667" y="3602060"/>
-            <a:ext cx="6723549" cy="848020"/>
+            <a:off x="2827867" y="3632199"/>
+            <a:ext cx="6146799" cy="821267"/>
           </a:xfrm>
           <a:prstGeom prst="rect">
             <a:avLst/>
           </a:prstGeom>
-          <a:noFill/>
+          <a:solidFill>
+            <a:schemeClr val="accent5">
+              <a:lumMod val="20000"/>
+              <a:lumOff val="80000"/>
+              <a:alpha val="20000"/>
+            </a:schemeClr>
+          </a:solidFill>
           <a:ln>
-            <a:solidFill>
-              <a:srgbClr val="FFC000"/>
-            </a:solidFill>
+            <a:noFill/>
           </a:ln>
         </p:spPr>
         <p:style>
@@ -3987,10 +4243,10 @@
       </p:sp>
       <p:sp>
         <p:nvSpPr>
-          <p:cNvPr id="18" name="Rectangle 17">
-            <a:extLst>
-              <a:ext uri="{FF2B5EF4-FFF2-40B4-BE49-F238E27FC236}">
-                <a16:creationId xmlns:a16="http://schemas.microsoft.com/office/drawing/2014/main" id="{F9BAF84C-9606-4F1A-1417-22F173FC1446}"/>
+          <p:cNvPr id="13" name="Rectangle 12">
+            <a:extLst>
+              <a:ext uri="{FF2B5EF4-FFF2-40B4-BE49-F238E27FC236}">
+                <a16:creationId xmlns:a16="http://schemas.microsoft.com/office/drawing/2014/main" id="{5B1372B4-B39D-60C6-3D20-07AB265975DF}"/>
               </a:ext>
             </a:extLst>
           </p:cNvPr>
@@ -3999,17 +4255,21 @@
         </p:nvSpPr>
         <p:spPr>
           <a:xfrm>
-            <a:off x="2237571" y="4449404"/>
-            <a:ext cx="3504861" cy="524932"/>
+            <a:off x="2810933" y="4445000"/>
+            <a:ext cx="2929467" cy="541868"/>
           </a:xfrm>
           <a:prstGeom prst="rect">
             <a:avLst/>
           </a:prstGeom>
-          <a:noFill/>
+          <a:solidFill>
+            <a:schemeClr val="tx2">
+              <a:lumMod val="50000"/>
+              <a:lumOff val="50000"/>
+              <a:alpha val="20000"/>
+            </a:schemeClr>
+          </a:solidFill>
           <a:ln>
-            <a:solidFill>
-              <a:srgbClr val="FFC000"/>
-            </a:solidFill>
+            <a:noFill/>
           </a:ln>
         </p:spPr>
         <p:style>
@@ -4039,10 +4299,10 @@
       </p:sp>
       <p:sp>
         <p:nvSpPr>
-          <p:cNvPr id="19" name="Rectangle 18">
-            <a:extLst>
-              <a:ext uri="{FF2B5EF4-FFF2-40B4-BE49-F238E27FC236}">
-                <a16:creationId xmlns:a16="http://schemas.microsoft.com/office/drawing/2014/main" id="{0E28134C-08E0-C0F8-C9E8-9209A07A20C5}"/>
+          <p:cNvPr id="14" name="Rectangle 13">
+            <a:extLst>
+              <a:ext uri="{FF2B5EF4-FFF2-40B4-BE49-F238E27FC236}">
+                <a16:creationId xmlns:a16="http://schemas.microsoft.com/office/drawing/2014/main" id="{F157C920-1E0B-0939-E07B-3E3851DDE2EF}"/>
               </a:ext>
             </a:extLst>
           </p:cNvPr>
@@ -4051,17 +4311,19 @@
         </p:nvSpPr>
         <p:spPr>
           <a:xfrm>
-            <a:off x="2237571" y="4961468"/>
-            <a:ext cx="2425869" cy="689524"/>
+            <a:off x="2819401" y="4978400"/>
+            <a:ext cx="1854200" cy="660400"/>
           </a:xfrm>
           <a:prstGeom prst="rect">
             <a:avLst/>
           </a:prstGeom>
-          <a:noFill/>
+          <a:solidFill>
+            <a:srgbClr val="C00000">
+              <a:alpha val="20000"/>
+            </a:srgbClr>
+          </a:solidFill>
           <a:ln>
-            <a:solidFill>
-              <a:srgbClr val="FFC000"/>
-            </a:solidFill>
+            <a:noFill/>
           </a:ln>
         </p:spPr>
         <p:style>
@@ -4091,10 +4353,10 @@
       </p:sp>
       <p:sp>
         <p:nvSpPr>
-          <p:cNvPr id="20" name="Rectangle 19">
-            <a:extLst>
-              <a:ext uri="{FF2B5EF4-FFF2-40B4-BE49-F238E27FC236}">
-                <a16:creationId xmlns:a16="http://schemas.microsoft.com/office/drawing/2014/main" id="{FAFA296A-05B6-CA06-F588-88FA49473674}"/>
+          <p:cNvPr id="15" name="Rectangle 14">
+            <a:extLst>
+              <a:ext uri="{FF2B5EF4-FFF2-40B4-BE49-F238E27FC236}">
+                <a16:creationId xmlns:a16="http://schemas.microsoft.com/office/drawing/2014/main" id="{34EE00C8-D392-0B7A-5DCF-B89D983D1AFE}"/>
               </a:ext>
             </a:extLst>
           </p:cNvPr>
@@ -4103,17 +4365,19 @@
         </p:nvSpPr>
         <p:spPr>
           <a:xfrm>
-            <a:off x="2237571" y="5657088"/>
-            <a:ext cx="3510957" cy="664464"/>
+            <a:off x="2819401" y="5663184"/>
+            <a:ext cx="2937931" cy="678348"/>
           </a:xfrm>
           <a:prstGeom prst="rect">
             <a:avLst/>
           </a:prstGeom>
-          <a:noFill/>
+          <a:solidFill>
+            <a:srgbClr val="92D050">
+              <a:alpha val="20000"/>
+            </a:srgbClr>
+          </a:solidFill>
           <a:ln>
-            <a:solidFill>
-              <a:srgbClr val="FFC000"/>
-            </a:solidFill>
+            <a:noFill/>
           </a:ln>
         </p:spPr>
         <p:style>
@@ -4141,6 +4405,266 @@
           </a:p>
         </p:txBody>
       </p:sp>
+      <p:sp>
+        <p:nvSpPr>
+          <p:cNvPr id="16" name="Rectangle 15">
+            <a:extLst>
+              <a:ext uri="{FF2B5EF4-FFF2-40B4-BE49-F238E27FC236}">
+                <a16:creationId xmlns:a16="http://schemas.microsoft.com/office/drawing/2014/main" id="{2589EA60-411F-2497-0990-135904A6C1A4}"/>
+              </a:ext>
+            </a:extLst>
+          </p:cNvPr>
+          <p:cNvSpPr/>
+          <p:nvPr/>
+        </p:nvSpPr>
+        <p:spPr>
+          <a:xfrm>
+            <a:off x="2243667" y="3285068"/>
+            <a:ext cx="1371599" cy="313266"/>
+          </a:xfrm>
+          <a:prstGeom prst="rect">
+            <a:avLst/>
+          </a:prstGeom>
+          <a:noFill/>
+          <a:ln>
+            <a:solidFill>
+              <a:srgbClr val="FFC000"/>
+            </a:solidFill>
+          </a:ln>
+        </p:spPr>
+        <p:style>
+          <a:lnRef idx="2">
+            <a:schemeClr val="accent1">
+              <a:shade val="15000"/>
+            </a:schemeClr>
+          </a:lnRef>
+          <a:fillRef idx="1">
+            <a:schemeClr val="accent1"/>
+          </a:fillRef>
+          <a:effectRef idx="0">
+            <a:schemeClr val="accent1"/>
+          </a:effectRef>
+          <a:fontRef idx="minor">
+            <a:schemeClr val="lt1"/>
+          </a:fontRef>
+        </p:style>
+        <p:txBody>
+          <a:bodyPr rtlCol="0" anchor="ctr"/>
+          <a:lstStyle/>
+          <a:p>
+            <a:pPr algn="ctr"/>
+            <a:endParaRPr lang="en-US"/>
+          </a:p>
+        </p:txBody>
+      </p:sp>
+      <p:sp>
+        <p:nvSpPr>
+          <p:cNvPr id="17" name="Rectangle 16">
+            <a:extLst>
+              <a:ext uri="{FF2B5EF4-FFF2-40B4-BE49-F238E27FC236}">
+                <a16:creationId xmlns:a16="http://schemas.microsoft.com/office/drawing/2014/main" id="{F3B55A15-4F46-FA8A-16B3-42FEC004A0C2}"/>
+              </a:ext>
+            </a:extLst>
+          </p:cNvPr>
+          <p:cNvSpPr/>
+          <p:nvPr/>
+        </p:nvSpPr>
+        <p:spPr>
+          <a:xfrm>
+            <a:off x="2243667" y="3602060"/>
+            <a:ext cx="6723549" cy="848020"/>
+          </a:xfrm>
+          <a:prstGeom prst="rect">
+            <a:avLst/>
+          </a:prstGeom>
+          <a:noFill/>
+          <a:ln>
+            <a:solidFill>
+              <a:srgbClr val="FFC000"/>
+            </a:solidFill>
+          </a:ln>
+        </p:spPr>
+        <p:style>
+          <a:lnRef idx="2">
+            <a:schemeClr val="accent1">
+              <a:shade val="15000"/>
+            </a:schemeClr>
+          </a:lnRef>
+          <a:fillRef idx="1">
+            <a:schemeClr val="accent1"/>
+          </a:fillRef>
+          <a:effectRef idx="0">
+            <a:schemeClr val="accent1"/>
+          </a:effectRef>
+          <a:fontRef idx="minor">
+            <a:schemeClr val="lt1"/>
+          </a:fontRef>
+        </p:style>
+        <p:txBody>
+          <a:bodyPr rtlCol="0" anchor="ctr"/>
+          <a:lstStyle/>
+          <a:p>
+            <a:pPr algn="ctr"/>
+            <a:endParaRPr lang="en-US"/>
+          </a:p>
+        </p:txBody>
+      </p:sp>
+      <p:sp>
+        <p:nvSpPr>
+          <p:cNvPr id="18" name="Rectangle 17">
+            <a:extLst>
+              <a:ext uri="{FF2B5EF4-FFF2-40B4-BE49-F238E27FC236}">
+                <a16:creationId xmlns:a16="http://schemas.microsoft.com/office/drawing/2014/main" id="{F9BAF84C-9606-4F1A-1417-22F173FC1446}"/>
+              </a:ext>
+            </a:extLst>
+          </p:cNvPr>
+          <p:cNvSpPr/>
+          <p:nvPr/>
+        </p:nvSpPr>
+        <p:spPr>
+          <a:xfrm>
+            <a:off x="2237571" y="4449404"/>
+            <a:ext cx="3504861" cy="524932"/>
+          </a:xfrm>
+          <a:prstGeom prst="rect">
+            <a:avLst/>
+          </a:prstGeom>
+          <a:noFill/>
+          <a:ln>
+            <a:solidFill>
+              <a:srgbClr val="FFC000"/>
+            </a:solidFill>
+          </a:ln>
+        </p:spPr>
+        <p:style>
+          <a:lnRef idx="2">
+            <a:schemeClr val="accent1">
+              <a:shade val="15000"/>
+            </a:schemeClr>
+          </a:lnRef>
+          <a:fillRef idx="1">
+            <a:schemeClr val="accent1"/>
+          </a:fillRef>
+          <a:effectRef idx="0">
+            <a:schemeClr val="accent1"/>
+          </a:effectRef>
+          <a:fontRef idx="minor">
+            <a:schemeClr val="lt1"/>
+          </a:fontRef>
+        </p:style>
+        <p:txBody>
+          <a:bodyPr rtlCol="0" anchor="ctr"/>
+          <a:lstStyle/>
+          <a:p>
+            <a:pPr algn="ctr"/>
+            <a:endParaRPr lang="en-US"/>
+          </a:p>
+        </p:txBody>
+      </p:sp>
+      <p:sp>
+        <p:nvSpPr>
+          <p:cNvPr id="19" name="Rectangle 18">
+            <a:extLst>
+              <a:ext uri="{FF2B5EF4-FFF2-40B4-BE49-F238E27FC236}">
+                <a16:creationId xmlns:a16="http://schemas.microsoft.com/office/drawing/2014/main" id="{0E28134C-08E0-C0F8-C9E8-9209A07A20C5}"/>
+              </a:ext>
+            </a:extLst>
+          </p:cNvPr>
+          <p:cNvSpPr/>
+          <p:nvPr/>
+        </p:nvSpPr>
+        <p:spPr>
+          <a:xfrm>
+            <a:off x="2237571" y="4961468"/>
+            <a:ext cx="2425869" cy="689524"/>
+          </a:xfrm>
+          <a:prstGeom prst="rect">
+            <a:avLst/>
+          </a:prstGeom>
+          <a:noFill/>
+          <a:ln>
+            <a:solidFill>
+              <a:srgbClr val="FFC000"/>
+            </a:solidFill>
+          </a:ln>
+        </p:spPr>
+        <p:style>
+          <a:lnRef idx="2">
+            <a:schemeClr val="accent1">
+              <a:shade val="15000"/>
+            </a:schemeClr>
+          </a:lnRef>
+          <a:fillRef idx="1">
+            <a:schemeClr val="accent1"/>
+          </a:fillRef>
+          <a:effectRef idx="0">
+            <a:schemeClr val="accent1"/>
+          </a:effectRef>
+          <a:fontRef idx="minor">
+            <a:schemeClr val="lt1"/>
+          </a:fontRef>
+        </p:style>
+        <p:txBody>
+          <a:bodyPr rtlCol="0" anchor="ctr"/>
+          <a:lstStyle/>
+          <a:p>
+            <a:pPr algn="ctr"/>
+            <a:endParaRPr lang="en-US"/>
+          </a:p>
+        </p:txBody>
+      </p:sp>
+      <p:sp>
+        <p:nvSpPr>
+          <p:cNvPr id="20" name="Rectangle 19">
+            <a:extLst>
+              <a:ext uri="{FF2B5EF4-FFF2-40B4-BE49-F238E27FC236}">
+                <a16:creationId xmlns:a16="http://schemas.microsoft.com/office/drawing/2014/main" id="{FAFA296A-05B6-CA06-F588-88FA49473674}"/>
+              </a:ext>
+            </a:extLst>
+          </p:cNvPr>
+          <p:cNvSpPr/>
+          <p:nvPr/>
+        </p:nvSpPr>
+        <p:spPr>
+          <a:xfrm>
+            <a:off x="2237571" y="5657088"/>
+            <a:ext cx="3510957" cy="664464"/>
+          </a:xfrm>
+          <a:prstGeom prst="rect">
+            <a:avLst/>
+          </a:prstGeom>
+          <a:noFill/>
+          <a:ln>
+            <a:solidFill>
+              <a:srgbClr val="FFC000"/>
+            </a:solidFill>
+          </a:ln>
+        </p:spPr>
+        <p:style>
+          <a:lnRef idx="2">
+            <a:schemeClr val="accent1">
+              <a:shade val="15000"/>
+            </a:schemeClr>
+          </a:lnRef>
+          <a:fillRef idx="1">
+            <a:schemeClr val="accent1"/>
+          </a:fillRef>
+          <a:effectRef idx="0">
+            <a:schemeClr val="accent1"/>
+          </a:effectRef>
+          <a:fontRef idx="minor">
+            <a:schemeClr val="lt1"/>
+          </a:fontRef>
+        </p:style>
+        <p:txBody>
+          <a:bodyPr rtlCol="0" anchor="ctr"/>
+          <a:lstStyle/>
+          <a:p>
+            <a:pPr algn="ctr"/>
+            <a:endParaRPr lang="en-US"/>
+          </a:p>
+        </p:txBody>
+      </p:sp>
     </p:spTree>
     <p:extLst>
       <p:ext uri="{BB962C8B-B14F-4D97-AF65-F5344CB8AC3E}">
@@ -4154,7 +4678,7 @@
 </p:sld>
 </file>
 
-<file path=ppt/slides/slide3.xml><?xml version="1.0" encoding="utf-8"?>
+<file path=ppt/slides/slide4.xml><?xml version="1.0" encoding="utf-8"?>
 <p:sld xmlns:a="http://schemas.openxmlformats.org/drawingml/2006/main" xmlns:r="http://schemas.openxmlformats.org/officeDocument/2006/relationships" xmlns:p="http://schemas.openxmlformats.org/presentationml/2006/main">
   <p:cSld>
     <p:spTree>
@@ -4287,8 +4811,8 @@
         </p:nvSpPr>
         <p:spPr>
           <a:xfrm flipV="1">
-            <a:off x="2218267" y="3302000"/>
-            <a:ext cx="1397000" cy="321733"/>
+            <a:off x="2802467" y="3301999"/>
+            <a:ext cx="812800" cy="321733"/>
           </a:xfrm>
           <a:prstGeom prst="rect">
             <a:avLst/>
@@ -4342,7 +4866,7 @@
 </p:sld>
 </file>
 
-<file path=ppt/slides/slide4.xml><?xml version="1.0" encoding="utf-8"?>
+<file path=ppt/slides/slide5.xml><?xml version="1.0" encoding="utf-8"?>
 <p:sld xmlns:a="http://schemas.openxmlformats.org/drawingml/2006/main" xmlns:r="http://schemas.openxmlformats.org/officeDocument/2006/relationships" xmlns:p="http://schemas.openxmlformats.org/presentationml/2006/main">
   <p:cSld>
     <p:spTree>
@@ -4409,8 +4933,8 @@
         </p:nvSpPr>
         <p:spPr>
           <a:xfrm>
-            <a:off x="2218266" y="3624557"/>
-            <a:ext cx="7137401" cy="837375"/>
+            <a:off x="2802467" y="3624557"/>
+            <a:ext cx="6189133" cy="837375"/>
           </a:xfrm>
           <a:prstGeom prst="rect">
             <a:avLst/>
@@ -4466,7 +4990,7 @@
         <p:spPr>
           <a:xfrm>
             <a:off x="431800" y="237067"/>
-            <a:ext cx="8712200" cy="2862322"/>
+            <a:ext cx="9499600" cy="2862322"/>
           </a:xfrm>
           <a:prstGeom prst="rect">
             <a:avLst/>
@@ -4545,7 +5069,7 @@
             </a:r>
             <a:r>
               <a:rPr lang="en-US" dirty="0"/>
-              <a:t> = semi-diameter (and mechanical semi-diameter); can be blank (automatic)</a:t>
+              <a:t> = semi-diameter (and mechanical semi-diameter); optional, can be left blank (automatic)</a:t>
             </a:r>
           </a:p>
           <a:p>
@@ -4567,8 +5091,8 @@
         </p:nvSpPr>
         <p:spPr>
           <a:xfrm>
-            <a:off x="7205132" y="505835"/>
-            <a:ext cx="4986867" cy="1477328"/>
+            <a:off x="7095065" y="522768"/>
+            <a:ext cx="4842935" cy="1477328"/>
           </a:xfrm>
           <a:prstGeom prst="rect">
             <a:avLst/>
@@ -4646,7 +5170,7 @@
 </p:sld>
 </file>
 
-<file path=ppt/slides/slide5.xml><?xml version="1.0" encoding="utf-8"?>
+<file path=ppt/slides/slide6.xml><?xml version="1.0" encoding="utf-8"?>
 <p:sld xmlns:a="http://schemas.openxmlformats.org/drawingml/2006/main" xmlns:r="http://schemas.openxmlformats.org/officeDocument/2006/relationships" xmlns:p="http://schemas.openxmlformats.org/presentationml/2006/main">
   <p:cSld>
     <p:spTree>
@@ -4713,8 +5237,8 @@
         </p:nvSpPr>
         <p:spPr>
           <a:xfrm>
-            <a:off x="2243667" y="4471224"/>
-            <a:ext cx="7476066" cy="498709"/>
+            <a:off x="2802467" y="4471224"/>
+            <a:ext cx="2946400" cy="498709"/>
           </a:xfrm>
           <a:prstGeom prst="rect">
             <a:avLst/>
@@ -4807,7 +5331,7 @@
             </a:r>
             <a:r>
               <a:rPr lang="en-US" dirty="0"/>
-              <a:t> = the surface which will be made aspheric</a:t>
+              <a:t> = the surface # which will be aspheric</a:t>
             </a:r>
           </a:p>
           <a:p>
@@ -4869,8 +5393,8 @@
         </p:nvSpPr>
         <p:spPr>
           <a:xfrm>
-            <a:off x="7205133" y="505835"/>
-            <a:ext cx="4614334" cy="2308324"/>
+            <a:off x="7205133" y="379591"/>
+            <a:ext cx="4614334" cy="2585323"/>
           </a:xfrm>
           <a:prstGeom prst="rect">
             <a:avLst/>
@@ -4902,7 +5426,23 @@
             </a:pPr>
             <a:r>
               <a:rPr lang="en-US" dirty="0"/>
-              <a:t>import supports </a:t>
+              <a:t>the column ordering is flexible, but they should all follow the format “</a:t>
+            </a:r>
+            <a:r>
+              <a:rPr lang="en-US" dirty="0" err="1"/>
+              <a:t>a_n</a:t>
+            </a:r>
+            <a:r>
+              <a:rPr lang="en-US" dirty="0"/>
+              <a:t>” (i.e. a_4 is the 4</a:t>
+            </a:r>
+            <a:r>
+              <a:rPr lang="en-US" baseline="30000" dirty="0"/>
+              <a:t>th</a:t>
+            </a:r>
+            <a:r>
+              <a:rPr lang="en-US" dirty="0"/>
+              <a:t> order </a:t>
             </a:r>
             <a:r>
               <a:rPr lang="en-US" dirty="0" err="1"/>
@@ -4910,7 +5450,7 @@
             </a:r>
             <a:r>
               <a:rPr lang="en-US" dirty="0"/>
-              <a:t> terms 1~240</a:t>
+              <a:t> term)</a:t>
             </a:r>
           </a:p>
           <a:p>
@@ -4920,7 +5460,7 @@
             </a:pPr>
             <a:r>
               <a:rPr lang="en-US" dirty="0"/>
-              <a:t>Add more columns to apply additional </a:t>
+              <a:t>import supports </a:t>
             </a:r>
             <a:r>
               <a:rPr lang="en-US" dirty="0" err="1"/>
@@ -4928,7 +5468,7 @@
             </a:r>
             <a:r>
               <a:rPr lang="en-US" dirty="0"/>
-              <a:t> terms</a:t>
+              <a:t> terms 1~240</a:t>
             </a:r>
           </a:p>
           <a:p>
@@ -4937,24 +5477,31 @@
               <a:buChar char="•"/>
             </a:pPr>
             <a:r>
+              <a:rPr lang="en-US" dirty="0"/>
+              <a:t>Add more columns to apply additional </a:t>
+            </a:r>
+            <a:r>
               <a:rPr lang="en-US" dirty="0" err="1"/>
               <a:t>asphere</a:t>
             </a:r>
             <a:r>
               <a:rPr lang="en-US" dirty="0"/>
-              <a:t> terms which are not set will be left as zero; the order is flexible, but they should all follow the format “</a:t>
-            </a:r>
+              <a:t> terms</a:t>
+            </a:r>
+          </a:p>
+          <a:p>
+            <a:pPr marL="285750" indent="-285750">
+              <a:buFont typeface="Arial" panose="020B0604020202020204" pitchFamily="34" charset="0"/>
+              <a:buChar char="•"/>
+            </a:pPr>
             <a:r>
               <a:rPr lang="en-US" dirty="0" err="1"/>
-              <a:t>a_n</a:t>
-            </a:r>
-            <a:r>
-              <a:rPr lang="en-US" dirty="0"/>
-              <a:t>”</a:t>
-            </a:r>
-          </a:p>
-          <a:p>
-            <a:endParaRPr lang="en-US" dirty="0"/>
+              <a:t>asphere</a:t>
+            </a:r>
+            <a:r>
+              <a:rPr lang="en-US" dirty="0"/>
+              <a:t> terms which are not set will be left as zero</a:t>
+            </a:r>
           </a:p>
         </p:txBody>
       </p:sp>
@@ -4971,7 +5518,7 @@
 </p:sld>
 </file>
 
-<file path=ppt/slides/slide6.xml><?xml version="1.0" encoding="utf-8"?>
+<file path=ppt/slides/slide7.xml><?xml version="1.0" encoding="utf-8"?>
 <p:sld xmlns:a="http://schemas.openxmlformats.org/drawingml/2006/main" xmlns:r="http://schemas.openxmlformats.org/officeDocument/2006/relationships" xmlns:p="http://schemas.openxmlformats.org/presentationml/2006/main">
   <p:cSld>
     <p:spTree>
@@ -5038,8 +5585,8 @@
         </p:nvSpPr>
         <p:spPr>
           <a:xfrm>
-            <a:off x="2235200" y="4978400"/>
-            <a:ext cx="7306695" cy="660399"/>
+            <a:off x="2836333" y="4978400"/>
+            <a:ext cx="1828800" cy="660399"/>
           </a:xfrm>
           <a:prstGeom prst="rect">
             <a:avLst/>
@@ -5150,7 +5697,7 @@
           <a:p>
             <a:r>
               <a:rPr lang="en-US" dirty="0"/>
-              <a:t>configuration keys are as follows:</a:t>
+              <a:t>config operand keys are as follows:</a:t>
             </a:r>
           </a:p>
           <a:p>
@@ -5202,8 +5749,8 @@
         </p:nvSpPr>
         <p:spPr>
           <a:xfrm>
-            <a:off x="7205133" y="505835"/>
-            <a:ext cx="4614334" cy="1754326"/>
+            <a:off x="7205133" y="167168"/>
+            <a:ext cx="4614334" cy="2862322"/>
           </a:xfrm>
           <a:prstGeom prst="rect">
             <a:avLst/>
@@ -5253,15 +5800,7 @@
             </a:pPr>
             <a:r>
               <a:rPr lang="en-US" dirty="0"/>
-              <a:t>there should be exactly one “</a:t>
-            </a:r>
-            <a:r>
-              <a:rPr lang="en-US" dirty="0" err="1"/>
-              <a:t>fno</a:t>
-            </a:r>
-            <a:r>
-              <a:rPr lang="en-US" dirty="0"/>
-              <a:t>” entry</a:t>
+              <a:t>Additional configurations are supported; with header i.e. “config_2”, etc.</a:t>
             </a:r>
           </a:p>
           <a:p>
@@ -5271,7 +5810,43 @@
             </a:pPr>
             <a:r>
               <a:rPr lang="en-US" dirty="0"/>
+              <a:t>there should be exactly one “</a:t>
+            </a:r>
+            <a:r>
+              <a:rPr lang="en-US" dirty="0" err="1"/>
+              <a:t>fno</a:t>
+            </a:r>
+            <a:r>
+              <a:rPr lang="en-US" dirty="0"/>
+              <a:t>” entry</a:t>
+            </a:r>
+          </a:p>
+          <a:p>
+            <a:pPr marL="285750" indent="-285750">
+              <a:buFont typeface="Arial" panose="020B0604020202020204" pitchFamily="34" charset="0"/>
+              <a:buChar char="•"/>
+            </a:pPr>
+            <a:r>
+              <a:rPr lang="en-US" dirty="0"/>
               <a:t>import currently assumes field type of Real Image Height</a:t>
+            </a:r>
+          </a:p>
+          <a:p>
+            <a:pPr marL="285750" indent="-285750">
+              <a:buFont typeface="Arial" panose="020B0604020202020204" pitchFamily="34" charset="0"/>
+              <a:buChar char="•"/>
+            </a:pPr>
+            <a:r>
+              <a:rPr lang="en-US" dirty="0"/>
+              <a:t>Only </a:t>
+            </a:r>
+            <a:r>
+              <a:rPr lang="en-US" dirty="0" err="1"/>
+              <a:t>fno</a:t>
+            </a:r>
+            <a:r>
+              <a:rPr lang="en-US" dirty="0"/>
+              <a:t>, thickness, and field height are currently supported for automatic import</a:t>
             </a:r>
           </a:p>
         </p:txBody>
@@ -5289,7 +5864,7 @@
 </p:sld>
 </file>
 
-<file path=ppt/slides/slide7.xml><?xml version="1.0" encoding="utf-8"?>
+<file path=ppt/slides/slide8.xml><?xml version="1.0" encoding="utf-8"?>
 <p:sld xmlns:a="http://schemas.openxmlformats.org/drawingml/2006/main" xmlns:r="http://schemas.openxmlformats.org/officeDocument/2006/relationships" xmlns:p="http://schemas.openxmlformats.org/presentationml/2006/main">
   <p:cSld>
     <p:spTree>
@@ -5356,8 +5931,8 @@
         </p:nvSpPr>
         <p:spPr>
           <a:xfrm>
-            <a:off x="2226734" y="5622691"/>
-            <a:ext cx="3530599" cy="686669"/>
+            <a:off x="2810933" y="5622691"/>
+            <a:ext cx="2946400" cy="686669"/>
           </a:xfrm>
           <a:prstGeom prst="rect">
             <a:avLst/>

</xml_diff>